<commit_message>
modificado a apresentação do previne brasis
</commit_message>
<xml_diff>
--- a/1- PrevineBrasil.pptx
+++ b/1- PrevineBrasil.pptx
@@ -31,6 +31,7 @@
     <p:sldId id="280" r:id="rId25"/>
     <p:sldId id="281" r:id="rId26"/>
     <p:sldId id="282" r:id="rId27"/>
+    <p:sldId id="283" r:id="rId28"/>
   </p:sldIdLst>
   <p:sldSz cx="12192000" cy="6858000"/>
   <p:notesSz cx="6858000" cy="9144000"/>
@@ -40823,7 +40824,7 @@
           <a:p>
             <a:fld id="{0FE468B3-7689-49AE-A190-2FCE0F400D8B}" type="datetimeFigureOut">
               <a:rPr lang="pt-BR" smtClean="0"/>
-              <a:t>23/05/2023</a:t>
+              <a:t>19/06/2023</a:t>
             </a:fld>
             <a:endParaRPr lang="pt-BR"/>
           </a:p>
@@ -41141,7 +41142,7 @@
           <a:p>
             <a:fld id="{0FE468B3-7689-49AE-A190-2FCE0F400D8B}" type="datetimeFigureOut">
               <a:rPr lang="pt-BR" smtClean="0"/>
-              <a:t>23/05/2023</a:t>
+              <a:t>19/06/2023</a:t>
             </a:fld>
             <a:endParaRPr lang="pt-BR"/>
           </a:p>
@@ -45960,6 +45961,92 @@
 </p:sld>
 </file>
 
+<file path=ppt/slides/slide27.xml><?xml version="1.0" encoding="utf-8"?>
+<p:sld xmlns:a="http://schemas.openxmlformats.org/drawingml/2006/main" xmlns:r="http://schemas.openxmlformats.org/officeDocument/2006/relationships" xmlns:p="http://schemas.openxmlformats.org/presentationml/2006/main">
+  <p:cSld>
+    <p:spTree>
+      <p:nvGrpSpPr>
+        <p:cNvPr id="1" name=""/>
+        <p:cNvGrpSpPr/>
+        <p:nvPr/>
+      </p:nvGrpSpPr>
+      <p:grpSpPr>
+        <a:xfrm>
+          <a:off x="0" y="0"/>
+          <a:ext cx="0" cy="0"/>
+          <a:chOff x="0" y="0"/>
+          <a:chExt cx="0" cy="0"/>
+        </a:xfrm>
+      </p:grpSpPr>
+      <p:sp>
+        <p:nvSpPr>
+          <p:cNvPr id="2" name="Título 1">
+            <a:extLst>
+              <a:ext uri="{FF2B5EF4-FFF2-40B4-BE49-F238E27FC236}">
+                <a16:creationId xmlns:a16="http://schemas.microsoft.com/office/drawing/2014/main" id="{42ED2775-C6C3-0BB1-F62E-67C6203E8B17}"/>
+              </a:ext>
+            </a:extLst>
+          </p:cNvPr>
+          <p:cNvSpPr>
+            <a:spLocks noGrp="1"/>
+          </p:cNvSpPr>
+          <p:nvPr>
+            <p:ph type="title"/>
+          </p:nvPr>
+        </p:nvSpPr>
+        <p:spPr/>
+        <p:txBody>
+          <a:bodyPr/>
+          <a:lstStyle/>
+          <a:p>
+            <a:r>
+              <a:rPr lang="pt-BR"/>
+              <a:t>Teste</a:t>
+            </a:r>
+          </a:p>
+        </p:txBody>
+      </p:sp>
+      <p:sp>
+        <p:nvSpPr>
+          <p:cNvPr id="3" name="Espaço Reservado para Conteúdo 2">
+            <a:extLst>
+              <a:ext uri="{FF2B5EF4-FFF2-40B4-BE49-F238E27FC236}">
+                <a16:creationId xmlns:a16="http://schemas.microsoft.com/office/drawing/2014/main" id="{697E1344-2640-2CD2-191C-12F4BC5F5684}"/>
+              </a:ext>
+            </a:extLst>
+          </p:cNvPr>
+          <p:cNvSpPr>
+            <a:spLocks noGrp="1"/>
+          </p:cNvSpPr>
+          <p:nvPr>
+            <p:ph idx="1"/>
+          </p:nvPr>
+        </p:nvSpPr>
+        <p:spPr/>
+        <p:txBody>
+          <a:bodyPr/>
+          <a:lstStyle/>
+          <a:p>
+            <a:endParaRPr lang="pt-BR"/>
+          </a:p>
+        </p:txBody>
+      </p:sp>
+    </p:spTree>
+    <p:extLst>
+      <p:ext uri="{BB962C8B-B14F-4D97-AF65-F5344CB8AC3E}">
+        <p14:creationId xmlns:p14="http://schemas.microsoft.com/office/powerpoint/2010/main" val="4161384670"/>
+      </p:ext>
+    </p:extLst>
+  </p:cSld>
+  <p:clrMapOvr>
+    <a:masterClrMapping/>
+  </p:clrMapOvr>
+  <p:transition spd="slow">
+    <p:randomBar dir="vert"/>
+  </p:transition>
+</p:sld>
+</file>
+
 <file path=ppt/slides/slide3.xml><?xml version="1.0" encoding="utf-8"?>
 <p:sld xmlns:a="http://schemas.openxmlformats.org/drawingml/2006/main" xmlns:r="http://schemas.openxmlformats.org/officeDocument/2006/relationships" xmlns:p="http://schemas.openxmlformats.org/presentationml/2006/main">
   <p:cSld>

</xml_diff>